<commit_message>
js DOM and CSS
</commit_message>
<xml_diff>
--- a/JS Fundamentals/9.DOM&CSS/DOM&CSS.pptx
+++ b/JS Fundamentals/9.DOM&CSS/DOM&CSS.pptx
@@ -2106,6 +2106,1432 @@
       <dsp:cNvGrpSpPr/>
     </dsp:nvGrpSpPr>
     <dsp:grpSpPr/>
+    <dsp:sp modelId="{AEA8BC4E-A54D-4965-9AC8-09D42686A32B}">
+      <dsp:nvSpPr>
+        <dsp:cNvPr id="0" name=""/>
+        <dsp:cNvSpPr/>
+      </dsp:nvSpPr>
+      <dsp:spPr>
+        <a:xfrm>
+          <a:off x="2631802" y="2560185"/>
+          <a:ext cx="91440" cy="349140"/>
+        </a:xfrm>
+        <a:custGeom>
+          <a:avLst/>
+          <a:gdLst/>
+          <a:ahLst/>
+          <a:cxnLst/>
+          <a:rect l="0" t="0" r="0" b="0"/>
+          <a:pathLst>
+            <a:path>
+              <a:moveTo>
+                <a:pt x="45720" y="0"/>
+              </a:moveTo>
+              <a:lnTo>
+                <a:pt x="45720" y="349140"/>
+              </a:lnTo>
+              <a:lnTo>
+                <a:pt x="125415" y="349140"/>
+              </a:lnTo>
+            </a:path>
+          </a:pathLst>
+        </a:custGeom>
+        <a:noFill/>
+        <a:ln w="15875" cap="rnd" cmpd="sng" algn="ctr">
+          <a:solidFill>
+            <a:schemeClr val="accent1">
+              <a:shade val="80000"/>
+              <a:hueOff val="0"/>
+              <a:satOff val="0"/>
+              <a:lumOff val="0"/>
+              <a:alphaOff val="0"/>
+            </a:schemeClr>
+          </a:solidFill>
+          <a:prstDash val="solid"/>
+        </a:ln>
+        <a:effectLst/>
+      </dsp:spPr>
+      <dsp:style>
+        <a:lnRef idx="2">
+          <a:scrgbClr r="0" g="0" b="0"/>
+        </a:lnRef>
+        <a:fillRef idx="0">
+          <a:scrgbClr r="0" g="0" b="0"/>
+        </a:fillRef>
+        <a:effectRef idx="0">
+          <a:scrgbClr r="0" g="0" b="0"/>
+        </a:effectRef>
+        <a:fontRef idx="minor"/>
+      </dsp:style>
+    </dsp:sp>
+    <dsp:sp modelId="{2D731E8B-3377-441E-B5C0-D91B17DFDDB1}">
+      <dsp:nvSpPr>
+        <dsp:cNvPr id="0" name=""/>
+        <dsp:cNvSpPr/>
+      </dsp:nvSpPr>
+      <dsp:spPr>
+        <a:xfrm>
+          <a:off x="2552107" y="2560185"/>
+          <a:ext cx="91440" cy="349140"/>
+        </a:xfrm>
+        <a:custGeom>
+          <a:avLst/>
+          <a:gdLst/>
+          <a:ahLst/>
+          <a:cxnLst/>
+          <a:rect l="0" t="0" r="0" b="0"/>
+          <a:pathLst>
+            <a:path>
+              <a:moveTo>
+                <a:pt x="125415" y="0"/>
+              </a:moveTo>
+              <a:lnTo>
+                <a:pt x="125415" y="349140"/>
+              </a:lnTo>
+              <a:lnTo>
+                <a:pt x="45720" y="349140"/>
+              </a:lnTo>
+            </a:path>
+          </a:pathLst>
+        </a:custGeom>
+        <a:noFill/>
+        <a:ln w="15875" cap="rnd" cmpd="sng" algn="ctr">
+          <a:solidFill>
+            <a:schemeClr val="accent1">
+              <a:shade val="80000"/>
+              <a:hueOff val="0"/>
+              <a:satOff val="0"/>
+              <a:lumOff val="0"/>
+              <a:alphaOff val="0"/>
+            </a:schemeClr>
+          </a:solidFill>
+          <a:prstDash val="solid"/>
+        </a:ln>
+        <a:effectLst/>
+      </dsp:spPr>
+      <dsp:style>
+        <a:lnRef idx="2">
+          <a:scrgbClr r="0" g="0" b="0"/>
+        </a:lnRef>
+        <a:fillRef idx="0">
+          <a:scrgbClr r="0" g="0" b="0"/>
+        </a:fillRef>
+        <a:effectRef idx="0">
+          <a:scrgbClr r="0" g="0" b="0"/>
+        </a:effectRef>
+        <a:fontRef idx="minor"/>
+      </dsp:style>
+    </dsp:sp>
+    <dsp:sp modelId="{51C19663-6DE7-4844-BD20-F60DCDEDECF6}">
+      <dsp:nvSpPr>
+        <dsp:cNvPr id="0" name=""/>
+        <dsp:cNvSpPr/>
+      </dsp:nvSpPr>
+      <dsp:spPr>
+        <a:xfrm>
+          <a:off x="3057022" y="2021295"/>
+          <a:ext cx="538890" cy="349140"/>
+        </a:xfrm>
+        <a:custGeom>
+          <a:avLst/>
+          <a:gdLst/>
+          <a:ahLst/>
+          <a:cxnLst/>
+          <a:rect l="0" t="0" r="0" b="0"/>
+          <a:pathLst>
+            <a:path>
+              <a:moveTo>
+                <a:pt x="538890" y="0"/>
+              </a:moveTo>
+              <a:lnTo>
+                <a:pt x="538890" y="349140"/>
+              </a:lnTo>
+              <a:lnTo>
+                <a:pt x="0" y="349140"/>
+              </a:lnTo>
+            </a:path>
+          </a:pathLst>
+        </a:custGeom>
+        <a:noFill/>
+        <a:ln w="15875" cap="rnd" cmpd="sng" algn="ctr">
+          <a:solidFill>
+            <a:schemeClr val="accent1">
+              <a:shade val="80000"/>
+              <a:hueOff val="0"/>
+              <a:satOff val="0"/>
+              <a:lumOff val="0"/>
+              <a:alphaOff val="0"/>
+            </a:schemeClr>
+          </a:solidFill>
+          <a:prstDash val="solid"/>
+        </a:ln>
+        <a:effectLst/>
+      </dsp:spPr>
+      <dsp:style>
+        <a:lnRef idx="2">
+          <a:scrgbClr r="0" g="0" b="0"/>
+        </a:lnRef>
+        <a:fillRef idx="0">
+          <a:scrgbClr r="0" g="0" b="0"/>
+        </a:fillRef>
+        <a:effectRef idx="0">
+          <a:scrgbClr r="0" g="0" b="0"/>
+        </a:effectRef>
+        <a:fontRef idx="minor"/>
+      </dsp:style>
+    </dsp:sp>
+    <dsp:sp modelId="{25C02BFE-C8A8-463C-A410-DC3CF0BF2589}">
+      <dsp:nvSpPr>
+        <dsp:cNvPr id="0" name=""/>
+        <dsp:cNvSpPr/>
+      </dsp:nvSpPr>
+      <dsp:spPr>
+        <a:xfrm>
+          <a:off x="3929692" y="943514"/>
+          <a:ext cx="91440" cy="888030"/>
+        </a:xfrm>
+        <a:custGeom>
+          <a:avLst/>
+          <a:gdLst/>
+          <a:ahLst/>
+          <a:cxnLst/>
+          <a:rect l="0" t="0" r="0" b="0"/>
+          <a:pathLst>
+            <a:path>
+              <a:moveTo>
+                <a:pt x="125415" y="0"/>
+              </a:moveTo>
+              <a:lnTo>
+                <a:pt x="125415" y="888030"/>
+              </a:lnTo>
+              <a:lnTo>
+                <a:pt x="45720" y="888030"/>
+              </a:lnTo>
+            </a:path>
+          </a:pathLst>
+        </a:custGeom>
+        <a:noFill/>
+        <a:ln w="15875" cap="rnd" cmpd="sng" algn="ctr">
+          <a:solidFill>
+            <a:schemeClr val="accent1">
+              <a:shade val="80000"/>
+              <a:hueOff val="0"/>
+              <a:satOff val="0"/>
+              <a:lumOff val="0"/>
+              <a:alphaOff val="0"/>
+            </a:schemeClr>
+          </a:solidFill>
+          <a:prstDash val="solid"/>
+        </a:ln>
+        <a:effectLst/>
+      </dsp:spPr>
+      <dsp:style>
+        <a:lnRef idx="2">
+          <a:scrgbClr r="0" g="0" b="0"/>
+        </a:lnRef>
+        <a:fillRef idx="0">
+          <a:scrgbClr r="0" g="0" b="0"/>
+        </a:fillRef>
+        <a:effectRef idx="0">
+          <a:scrgbClr r="0" g="0" b="0"/>
+        </a:effectRef>
+        <a:fontRef idx="minor"/>
+      </dsp:style>
+    </dsp:sp>
+    <dsp:sp modelId="{6913EDEB-049B-4293-A7E0-6ED98FF047AE}">
+      <dsp:nvSpPr>
+        <dsp:cNvPr id="0" name=""/>
+        <dsp:cNvSpPr/>
+      </dsp:nvSpPr>
+      <dsp:spPr>
+        <a:xfrm>
+          <a:off x="4009387" y="943514"/>
+          <a:ext cx="91440" cy="349140"/>
+        </a:xfrm>
+        <a:custGeom>
+          <a:avLst/>
+          <a:gdLst/>
+          <a:ahLst/>
+          <a:cxnLst/>
+          <a:rect l="0" t="0" r="0" b="0"/>
+          <a:pathLst>
+            <a:path>
+              <a:moveTo>
+                <a:pt x="45720" y="0"/>
+              </a:moveTo>
+              <a:lnTo>
+                <a:pt x="45720" y="349140"/>
+              </a:lnTo>
+              <a:lnTo>
+                <a:pt x="125415" y="349140"/>
+              </a:lnTo>
+            </a:path>
+          </a:pathLst>
+        </a:custGeom>
+        <a:noFill/>
+        <a:ln w="15875" cap="rnd" cmpd="sng" algn="ctr">
+          <a:solidFill>
+            <a:schemeClr val="accent1">
+              <a:shade val="80000"/>
+              <a:hueOff val="0"/>
+              <a:satOff val="0"/>
+              <a:lumOff val="0"/>
+              <a:alphaOff val="0"/>
+            </a:schemeClr>
+          </a:solidFill>
+          <a:prstDash val="solid"/>
+        </a:ln>
+        <a:effectLst/>
+      </dsp:spPr>
+      <dsp:style>
+        <a:lnRef idx="2">
+          <a:scrgbClr r="0" g="0" b="0"/>
+        </a:lnRef>
+        <a:fillRef idx="0">
+          <a:scrgbClr r="0" g="0" b="0"/>
+        </a:fillRef>
+        <a:effectRef idx="0">
+          <a:scrgbClr r="0" g="0" b="0"/>
+        </a:effectRef>
+        <a:fontRef idx="minor"/>
+      </dsp:style>
+    </dsp:sp>
+    <dsp:sp modelId="{880FCD53-0637-4FD6-8288-0C5595847207}">
+      <dsp:nvSpPr>
+        <dsp:cNvPr id="0" name=""/>
+        <dsp:cNvSpPr/>
+      </dsp:nvSpPr>
+      <dsp:spPr>
+        <a:xfrm>
+          <a:off x="2597827" y="943514"/>
+          <a:ext cx="1457280" cy="349140"/>
+        </a:xfrm>
+        <a:custGeom>
+          <a:avLst/>
+          <a:gdLst/>
+          <a:ahLst/>
+          <a:cxnLst/>
+          <a:rect l="0" t="0" r="0" b="0"/>
+          <a:pathLst>
+            <a:path>
+              <a:moveTo>
+                <a:pt x="1457280" y="0"/>
+              </a:moveTo>
+              <a:lnTo>
+                <a:pt x="1457280" y="349140"/>
+              </a:lnTo>
+              <a:lnTo>
+                <a:pt x="0" y="349140"/>
+              </a:lnTo>
+            </a:path>
+          </a:pathLst>
+        </a:custGeom>
+        <a:noFill/>
+        <a:ln w="15875" cap="rnd" cmpd="sng" algn="ctr">
+          <a:solidFill>
+            <a:schemeClr val="accent1">
+              <a:shade val="80000"/>
+              <a:hueOff val="0"/>
+              <a:satOff val="0"/>
+              <a:lumOff val="0"/>
+              <a:alphaOff val="0"/>
+            </a:schemeClr>
+          </a:solidFill>
+          <a:prstDash val="solid"/>
+        </a:ln>
+        <a:effectLst/>
+      </dsp:spPr>
+      <dsp:style>
+        <a:lnRef idx="2">
+          <a:scrgbClr r="0" g="0" b="0"/>
+        </a:lnRef>
+        <a:fillRef idx="0">
+          <a:scrgbClr r="0" g="0" b="0"/>
+        </a:fillRef>
+        <a:effectRef idx="0">
+          <a:scrgbClr r="0" g="0" b="0"/>
+        </a:effectRef>
+        <a:fontRef idx="minor"/>
+      </dsp:style>
+    </dsp:sp>
+    <dsp:sp modelId="{03E73AC7-FDA7-48D9-A333-51DED90D1927}">
+      <dsp:nvSpPr>
+        <dsp:cNvPr id="0" name=""/>
+        <dsp:cNvSpPr/>
+      </dsp:nvSpPr>
+      <dsp:spPr>
+        <a:xfrm>
+          <a:off x="1759132" y="404624"/>
+          <a:ext cx="1916475" cy="349140"/>
+        </a:xfrm>
+        <a:custGeom>
+          <a:avLst/>
+          <a:gdLst/>
+          <a:ahLst/>
+          <a:cxnLst/>
+          <a:rect l="0" t="0" r="0" b="0"/>
+          <a:pathLst>
+            <a:path>
+              <a:moveTo>
+                <a:pt x="0" y="0"/>
+              </a:moveTo>
+              <a:lnTo>
+                <a:pt x="0" y="349140"/>
+              </a:lnTo>
+              <a:lnTo>
+                <a:pt x="1916475" y="349140"/>
+              </a:lnTo>
+            </a:path>
+          </a:pathLst>
+        </a:custGeom>
+        <a:noFill/>
+        <a:ln w="15875" cap="rnd" cmpd="sng" algn="ctr">
+          <a:solidFill>
+            <a:schemeClr val="accent1">
+              <a:shade val="60000"/>
+              <a:hueOff val="0"/>
+              <a:satOff val="0"/>
+              <a:lumOff val="0"/>
+              <a:alphaOff val="0"/>
+            </a:schemeClr>
+          </a:solidFill>
+          <a:prstDash val="solid"/>
+        </a:ln>
+        <a:effectLst/>
+      </dsp:spPr>
+      <dsp:style>
+        <a:lnRef idx="2">
+          <a:scrgbClr r="0" g="0" b="0"/>
+        </a:lnRef>
+        <a:fillRef idx="0">
+          <a:scrgbClr r="0" g="0" b="0"/>
+        </a:fillRef>
+        <a:effectRef idx="0">
+          <a:scrgbClr r="0" g="0" b="0"/>
+        </a:effectRef>
+        <a:fontRef idx="minor"/>
+      </dsp:style>
+    </dsp:sp>
+    <dsp:sp modelId="{FCD05725-53A5-4BD4-A02D-20DE1CDFA140}">
+      <dsp:nvSpPr>
+        <dsp:cNvPr id="0" name=""/>
+        <dsp:cNvSpPr/>
+      </dsp:nvSpPr>
+      <dsp:spPr>
+        <a:xfrm>
+          <a:off x="795022" y="943514"/>
+          <a:ext cx="91440" cy="349140"/>
+        </a:xfrm>
+        <a:custGeom>
+          <a:avLst/>
+          <a:gdLst/>
+          <a:ahLst/>
+          <a:cxnLst/>
+          <a:rect l="0" t="0" r="0" b="0"/>
+          <a:pathLst>
+            <a:path>
+              <a:moveTo>
+                <a:pt x="45720" y="0"/>
+              </a:moveTo>
+              <a:lnTo>
+                <a:pt x="45720" y="349140"/>
+              </a:lnTo>
+              <a:lnTo>
+                <a:pt x="125415" y="349140"/>
+              </a:lnTo>
+            </a:path>
+          </a:pathLst>
+        </a:custGeom>
+        <a:noFill/>
+        <a:ln w="15875" cap="rnd" cmpd="sng" algn="ctr">
+          <a:solidFill>
+            <a:schemeClr val="accent1">
+              <a:shade val="80000"/>
+              <a:hueOff val="0"/>
+              <a:satOff val="0"/>
+              <a:lumOff val="0"/>
+              <a:alphaOff val="0"/>
+            </a:schemeClr>
+          </a:solidFill>
+          <a:prstDash val="solid"/>
+        </a:ln>
+        <a:effectLst/>
+      </dsp:spPr>
+      <dsp:style>
+        <a:lnRef idx="2">
+          <a:scrgbClr r="0" g="0" b="0"/>
+        </a:lnRef>
+        <a:fillRef idx="0">
+          <a:scrgbClr r="0" g="0" b="0"/>
+        </a:fillRef>
+        <a:effectRef idx="0">
+          <a:scrgbClr r="0" g="0" b="0"/>
+        </a:effectRef>
+        <a:fontRef idx="minor"/>
+      </dsp:style>
+    </dsp:sp>
+    <dsp:sp modelId="{C9538D54-269D-4989-8BD5-071F73FD396C}">
+      <dsp:nvSpPr>
+        <dsp:cNvPr id="0" name=""/>
+        <dsp:cNvSpPr/>
+      </dsp:nvSpPr>
+      <dsp:spPr>
+        <a:xfrm>
+          <a:off x="715327" y="943514"/>
+          <a:ext cx="91440" cy="349140"/>
+        </a:xfrm>
+        <a:custGeom>
+          <a:avLst/>
+          <a:gdLst/>
+          <a:ahLst/>
+          <a:cxnLst/>
+          <a:rect l="0" t="0" r="0" b="0"/>
+          <a:pathLst>
+            <a:path>
+              <a:moveTo>
+                <a:pt x="125415" y="0"/>
+              </a:moveTo>
+              <a:lnTo>
+                <a:pt x="125415" y="349140"/>
+              </a:lnTo>
+              <a:lnTo>
+                <a:pt x="45720" y="349140"/>
+              </a:lnTo>
+            </a:path>
+          </a:pathLst>
+        </a:custGeom>
+        <a:noFill/>
+        <a:ln w="15875" cap="rnd" cmpd="sng" algn="ctr">
+          <a:solidFill>
+            <a:schemeClr val="accent1">
+              <a:shade val="80000"/>
+              <a:hueOff val="0"/>
+              <a:satOff val="0"/>
+              <a:lumOff val="0"/>
+              <a:alphaOff val="0"/>
+            </a:schemeClr>
+          </a:solidFill>
+          <a:prstDash val="solid"/>
+        </a:ln>
+        <a:effectLst/>
+      </dsp:spPr>
+      <dsp:style>
+        <a:lnRef idx="2">
+          <a:scrgbClr r="0" g="0" b="0"/>
+        </a:lnRef>
+        <a:fillRef idx="0">
+          <a:scrgbClr r="0" g="0" b="0"/>
+        </a:fillRef>
+        <a:effectRef idx="0">
+          <a:scrgbClr r="0" g="0" b="0"/>
+        </a:effectRef>
+        <a:fontRef idx="minor"/>
+      </dsp:style>
+    </dsp:sp>
+    <dsp:sp modelId="{458F6228-54FF-4A4E-BF06-61B212B61E6D}">
+      <dsp:nvSpPr>
+        <dsp:cNvPr id="0" name=""/>
+        <dsp:cNvSpPr/>
+      </dsp:nvSpPr>
+      <dsp:spPr>
+        <a:xfrm>
+          <a:off x="1220242" y="404624"/>
+          <a:ext cx="538890" cy="349140"/>
+        </a:xfrm>
+        <a:custGeom>
+          <a:avLst/>
+          <a:gdLst/>
+          <a:ahLst/>
+          <a:cxnLst/>
+          <a:rect l="0" t="0" r="0" b="0"/>
+          <a:pathLst>
+            <a:path>
+              <a:moveTo>
+                <a:pt x="538890" y="0"/>
+              </a:moveTo>
+              <a:lnTo>
+                <a:pt x="538890" y="349140"/>
+              </a:lnTo>
+              <a:lnTo>
+                <a:pt x="0" y="349140"/>
+              </a:lnTo>
+            </a:path>
+          </a:pathLst>
+        </a:custGeom>
+        <a:noFill/>
+        <a:ln w="15875" cap="rnd" cmpd="sng" algn="ctr">
+          <a:solidFill>
+            <a:schemeClr val="accent1">
+              <a:shade val="60000"/>
+              <a:hueOff val="0"/>
+              <a:satOff val="0"/>
+              <a:lumOff val="0"/>
+              <a:alphaOff val="0"/>
+            </a:schemeClr>
+          </a:solidFill>
+          <a:prstDash val="solid"/>
+        </a:ln>
+        <a:effectLst/>
+      </dsp:spPr>
+      <dsp:style>
+        <a:lnRef idx="2">
+          <a:scrgbClr r="0" g="0" b="0"/>
+        </a:lnRef>
+        <a:fillRef idx="0">
+          <a:scrgbClr r="0" g="0" b="0"/>
+        </a:fillRef>
+        <a:effectRef idx="0">
+          <a:scrgbClr r="0" g="0" b="0"/>
+        </a:effectRef>
+        <a:fontRef idx="minor"/>
+      </dsp:style>
+    </dsp:sp>
+    <dsp:sp modelId="{8EE5202F-171E-4381-9471-83F0E71A7539}">
+      <dsp:nvSpPr>
+        <dsp:cNvPr id="0" name=""/>
+        <dsp:cNvSpPr/>
+      </dsp:nvSpPr>
+      <dsp:spPr>
+        <a:xfrm>
+          <a:off x="1379632" y="25124"/>
+          <a:ext cx="759000" cy="379500"/>
+        </a:xfrm>
+        <a:prstGeom prst="rect">
+          <a:avLst/>
+        </a:prstGeom>
+        <a:solidFill>
+          <a:schemeClr val="accent1">
+            <a:hueOff val="0"/>
+            <a:satOff val="0"/>
+            <a:lumOff val="0"/>
+            <a:alphaOff val="0"/>
+          </a:schemeClr>
+        </a:solidFill>
+        <a:ln w="15875" cap="rnd" cmpd="sng" algn="ctr">
+          <a:solidFill>
+            <a:schemeClr val="lt1">
+              <a:hueOff val="0"/>
+              <a:satOff val="0"/>
+              <a:lumOff val="0"/>
+              <a:alphaOff val="0"/>
+            </a:schemeClr>
+          </a:solidFill>
+          <a:prstDash val="solid"/>
+        </a:ln>
+        <a:effectLst/>
+      </dsp:spPr>
+      <dsp:style>
+        <a:lnRef idx="2">
+          <a:scrgbClr r="0" g="0" b="0"/>
+        </a:lnRef>
+        <a:fillRef idx="1">
+          <a:scrgbClr r="0" g="0" b="0"/>
+        </a:fillRef>
+        <a:effectRef idx="0">
+          <a:scrgbClr r="0" g="0" b="0"/>
+        </a:effectRef>
+        <a:fontRef idx="minor">
+          <a:schemeClr val="lt1"/>
+        </a:fontRef>
+      </dsp:style>
+      <dsp:txBody>
+        <a:bodyPr spcFirstLastPara="0" vert="horz" wrap="square" lIns="15240" tIns="15240" rIns="15240" bIns="15240" numCol="1" spcCol="1270" anchor="ctr" anchorCtr="0">
+          <a:noAutofit/>
+        </a:bodyPr>
+        <a:lstStyle/>
+        <a:p>
+          <a:pPr lvl="0" algn="ctr" defTabSz="1066800">
+            <a:lnSpc>
+              <a:spcPct val="90000"/>
+            </a:lnSpc>
+            <a:spcBef>
+              <a:spcPct val="0"/>
+            </a:spcBef>
+            <a:spcAft>
+              <a:spcPct val="35000"/>
+            </a:spcAft>
+          </a:pPr>
+          <a:r>
+            <a:rPr lang="en-US" sz="2400" kern="1200" dirty="0" smtClean="0"/>
+            <a:t>html</a:t>
+          </a:r>
+        </a:p>
+      </dsp:txBody>
+      <dsp:txXfrm>
+        <a:off x="1379632" y="25124"/>
+        <a:ext cx="759000" cy="379500"/>
+      </dsp:txXfrm>
+    </dsp:sp>
+    <dsp:sp modelId="{127A4EBF-DC88-4D79-8664-1EDAEC4750B1}">
+      <dsp:nvSpPr>
+        <dsp:cNvPr id="0" name=""/>
+        <dsp:cNvSpPr/>
+      </dsp:nvSpPr>
+      <dsp:spPr>
+        <a:xfrm>
+          <a:off x="461242" y="564014"/>
+          <a:ext cx="759000" cy="379500"/>
+        </a:xfrm>
+        <a:prstGeom prst="rect">
+          <a:avLst/>
+        </a:prstGeom>
+        <a:solidFill>
+          <a:schemeClr val="accent1">
+            <a:hueOff val="0"/>
+            <a:satOff val="0"/>
+            <a:lumOff val="0"/>
+            <a:alphaOff val="0"/>
+          </a:schemeClr>
+        </a:solidFill>
+        <a:ln w="15875" cap="rnd" cmpd="sng" algn="ctr">
+          <a:solidFill>
+            <a:schemeClr val="lt1">
+              <a:hueOff val="0"/>
+              <a:satOff val="0"/>
+              <a:lumOff val="0"/>
+              <a:alphaOff val="0"/>
+            </a:schemeClr>
+          </a:solidFill>
+          <a:prstDash val="solid"/>
+        </a:ln>
+        <a:effectLst/>
+      </dsp:spPr>
+      <dsp:style>
+        <a:lnRef idx="2">
+          <a:scrgbClr r="0" g="0" b="0"/>
+        </a:lnRef>
+        <a:fillRef idx="1">
+          <a:scrgbClr r="0" g="0" b="0"/>
+        </a:fillRef>
+        <a:effectRef idx="0">
+          <a:scrgbClr r="0" g="0" b="0"/>
+        </a:effectRef>
+        <a:fontRef idx="minor">
+          <a:schemeClr val="lt1"/>
+        </a:fontRef>
+      </dsp:style>
+      <dsp:txBody>
+        <a:bodyPr spcFirstLastPara="0" vert="horz" wrap="square" lIns="15240" tIns="15240" rIns="15240" bIns="15240" numCol="1" spcCol="1270" anchor="ctr" anchorCtr="0">
+          <a:noAutofit/>
+        </a:bodyPr>
+        <a:lstStyle/>
+        <a:p>
+          <a:pPr lvl="0" algn="ctr" defTabSz="1066800">
+            <a:lnSpc>
+              <a:spcPct val="90000"/>
+            </a:lnSpc>
+            <a:spcBef>
+              <a:spcPct val="0"/>
+            </a:spcBef>
+            <a:spcAft>
+              <a:spcPct val="35000"/>
+            </a:spcAft>
+          </a:pPr>
+          <a:r>
+            <a:rPr lang="en-US" sz="2400" kern="1200" dirty="0" smtClean="0"/>
+            <a:t>head</a:t>
+          </a:r>
+          <a:endParaRPr lang="en-US" sz="2400" kern="1200" dirty="0"/>
+        </a:p>
+      </dsp:txBody>
+      <dsp:txXfrm>
+        <a:off x="461242" y="564014"/>
+        <a:ext cx="759000" cy="379500"/>
+      </dsp:txXfrm>
+    </dsp:sp>
+    <dsp:sp modelId="{37F5BF35-2DF3-4FA1-BB43-3CE58A394C47}">
+      <dsp:nvSpPr>
+        <dsp:cNvPr id="0" name=""/>
+        <dsp:cNvSpPr/>
+      </dsp:nvSpPr>
+      <dsp:spPr>
+        <a:xfrm>
+          <a:off x="2046" y="1102904"/>
+          <a:ext cx="759000" cy="379500"/>
+        </a:xfrm>
+        <a:prstGeom prst="rect">
+          <a:avLst/>
+        </a:prstGeom>
+        <a:solidFill>
+          <a:schemeClr val="accent1">
+            <a:hueOff val="0"/>
+            <a:satOff val="0"/>
+            <a:lumOff val="0"/>
+            <a:alphaOff val="0"/>
+          </a:schemeClr>
+        </a:solidFill>
+        <a:ln w="15875" cap="rnd" cmpd="sng" algn="ctr">
+          <a:solidFill>
+            <a:schemeClr val="lt1">
+              <a:hueOff val="0"/>
+              <a:satOff val="0"/>
+              <a:lumOff val="0"/>
+              <a:alphaOff val="0"/>
+            </a:schemeClr>
+          </a:solidFill>
+          <a:prstDash val="solid"/>
+        </a:ln>
+        <a:effectLst/>
+      </dsp:spPr>
+      <dsp:style>
+        <a:lnRef idx="2">
+          <a:scrgbClr r="0" g="0" b="0"/>
+        </a:lnRef>
+        <a:fillRef idx="1">
+          <a:scrgbClr r="0" g="0" b="0"/>
+        </a:fillRef>
+        <a:effectRef idx="0">
+          <a:scrgbClr r="0" g="0" b="0"/>
+        </a:effectRef>
+        <a:fontRef idx="minor">
+          <a:schemeClr val="lt1"/>
+        </a:fontRef>
+      </dsp:style>
+      <dsp:txBody>
+        <a:bodyPr spcFirstLastPara="0" vert="horz" wrap="square" lIns="15240" tIns="15240" rIns="15240" bIns="15240" numCol="1" spcCol="1270" anchor="ctr" anchorCtr="0">
+          <a:noAutofit/>
+        </a:bodyPr>
+        <a:lstStyle/>
+        <a:p>
+          <a:pPr lvl="0" algn="ctr" defTabSz="1066800">
+            <a:lnSpc>
+              <a:spcPct val="90000"/>
+            </a:lnSpc>
+            <a:spcBef>
+              <a:spcPct val="0"/>
+            </a:spcBef>
+            <a:spcAft>
+              <a:spcPct val="35000"/>
+            </a:spcAft>
+          </a:pPr>
+          <a:r>
+            <a:rPr lang="en-US" sz="2400" kern="1200" dirty="0" smtClean="0"/>
+            <a:t>title</a:t>
+          </a:r>
+          <a:endParaRPr lang="en-US" sz="2400" kern="1200" dirty="0"/>
+        </a:p>
+      </dsp:txBody>
+      <dsp:txXfrm>
+        <a:off x="2046" y="1102904"/>
+        <a:ext cx="759000" cy="379500"/>
+      </dsp:txXfrm>
+    </dsp:sp>
+    <dsp:sp modelId="{6221CD2B-9452-451D-A9D4-E1CC117A4AAC}">
+      <dsp:nvSpPr>
+        <dsp:cNvPr id="0" name=""/>
+        <dsp:cNvSpPr/>
+      </dsp:nvSpPr>
+      <dsp:spPr>
+        <a:xfrm>
+          <a:off x="920437" y="1102904"/>
+          <a:ext cx="759000" cy="379500"/>
+        </a:xfrm>
+        <a:prstGeom prst="rect">
+          <a:avLst/>
+        </a:prstGeom>
+        <a:solidFill>
+          <a:schemeClr val="accent1">
+            <a:hueOff val="0"/>
+            <a:satOff val="0"/>
+            <a:lumOff val="0"/>
+            <a:alphaOff val="0"/>
+          </a:schemeClr>
+        </a:solidFill>
+        <a:ln w="15875" cap="rnd" cmpd="sng" algn="ctr">
+          <a:solidFill>
+            <a:schemeClr val="lt1">
+              <a:hueOff val="0"/>
+              <a:satOff val="0"/>
+              <a:lumOff val="0"/>
+              <a:alphaOff val="0"/>
+            </a:schemeClr>
+          </a:solidFill>
+          <a:prstDash val="solid"/>
+        </a:ln>
+        <a:effectLst/>
+      </dsp:spPr>
+      <dsp:style>
+        <a:lnRef idx="2">
+          <a:scrgbClr r="0" g="0" b="0"/>
+        </a:lnRef>
+        <a:fillRef idx="1">
+          <a:scrgbClr r="0" g="0" b="0"/>
+        </a:fillRef>
+        <a:effectRef idx="0">
+          <a:scrgbClr r="0" g="0" b="0"/>
+        </a:effectRef>
+        <a:fontRef idx="minor">
+          <a:schemeClr val="lt1"/>
+        </a:fontRef>
+      </dsp:style>
+      <dsp:txBody>
+        <a:bodyPr spcFirstLastPara="0" vert="horz" wrap="square" lIns="15240" tIns="15240" rIns="15240" bIns="15240" numCol="1" spcCol="1270" anchor="ctr" anchorCtr="0">
+          <a:noAutofit/>
+        </a:bodyPr>
+        <a:lstStyle/>
+        <a:p>
+          <a:pPr lvl="0" algn="ctr" defTabSz="1066800">
+            <a:lnSpc>
+              <a:spcPct val="90000"/>
+            </a:lnSpc>
+            <a:spcBef>
+              <a:spcPct val="0"/>
+            </a:spcBef>
+            <a:spcAft>
+              <a:spcPct val="35000"/>
+            </a:spcAft>
+          </a:pPr>
+          <a:r>
+            <a:rPr lang="en-US" sz="2400" kern="1200" dirty="0" smtClean="0"/>
+            <a:t>link</a:t>
+          </a:r>
+          <a:endParaRPr lang="en-US" sz="2400" kern="1200" dirty="0"/>
+        </a:p>
+      </dsp:txBody>
+      <dsp:txXfrm>
+        <a:off x="920437" y="1102904"/>
+        <a:ext cx="759000" cy="379500"/>
+      </dsp:txXfrm>
+    </dsp:sp>
+    <dsp:sp modelId="{571DA24D-CB8A-4E3E-92D0-BF64DFC7EA98}">
+      <dsp:nvSpPr>
+        <dsp:cNvPr id="0" name=""/>
+        <dsp:cNvSpPr/>
+      </dsp:nvSpPr>
+      <dsp:spPr>
+        <a:xfrm>
+          <a:off x="3675607" y="564014"/>
+          <a:ext cx="759000" cy="379500"/>
+        </a:xfrm>
+        <a:prstGeom prst="rect">
+          <a:avLst/>
+        </a:prstGeom>
+        <a:solidFill>
+          <a:schemeClr val="accent1">
+            <a:hueOff val="0"/>
+            <a:satOff val="0"/>
+            <a:lumOff val="0"/>
+            <a:alphaOff val="0"/>
+          </a:schemeClr>
+        </a:solidFill>
+        <a:ln w="15875" cap="rnd" cmpd="sng" algn="ctr">
+          <a:solidFill>
+            <a:schemeClr val="lt1">
+              <a:hueOff val="0"/>
+              <a:satOff val="0"/>
+              <a:lumOff val="0"/>
+              <a:alphaOff val="0"/>
+            </a:schemeClr>
+          </a:solidFill>
+          <a:prstDash val="solid"/>
+        </a:ln>
+        <a:effectLst/>
+      </dsp:spPr>
+      <dsp:style>
+        <a:lnRef idx="2">
+          <a:scrgbClr r="0" g="0" b="0"/>
+        </a:lnRef>
+        <a:fillRef idx="1">
+          <a:scrgbClr r="0" g="0" b="0"/>
+        </a:fillRef>
+        <a:effectRef idx="0">
+          <a:scrgbClr r="0" g="0" b="0"/>
+        </a:effectRef>
+        <a:fontRef idx="minor">
+          <a:schemeClr val="lt1"/>
+        </a:fontRef>
+      </dsp:style>
+      <dsp:txBody>
+        <a:bodyPr spcFirstLastPara="0" vert="horz" wrap="square" lIns="15240" tIns="15240" rIns="15240" bIns="15240" numCol="1" spcCol="1270" anchor="ctr" anchorCtr="0">
+          <a:noAutofit/>
+        </a:bodyPr>
+        <a:lstStyle/>
+        <a:p>
+          <a:pPr lvl="0" algn="ctr" defTabSz="1066800">
+            <a:lnSpc>
+              <a:spcPct val="90000"/>
+            </a:lnSpc>
+            <a:spcBef>
+              <a:spcPct val="0"/>
+            </a:spcBef>
+            <a:spcAft>
+              <a:spcPct val="35000"/>
+            </a:spcAft>
+          </a:pPr>
+          <a:r>
+            <a:rPr lang="en-US" sz="2400" kern="1200" dirty="0" smtClean="0"/>
+            <a:t>body</a:t>
+          </a:r>
+          <a:endParaRPr lang="en-US" sz="2400" kern="1200" dirty="0"/>
+        </a:p>
+      </dsp:txBody>
+      <dsp:txXfrm>
+        <a:off x="3675607" y="564014"/>
+        <a:ext cx="759000" cy="379500"/>
+      </dsp:txXfrm>
+    </dsp:sp>
+    <dsp:sp modelId="{E1523126-47D1-4BCB-B9E3-E15528F6043C}">
+      <dsp:nvSpPr>
+        <dsp:cNvPr id="0" name=""/>
+        <dsp:cNvSpPr/>
+      </dsp:nvSpPr>
+      <dsp:spPr>
+        <a:xfrm>
+          <a:off x="1838827" y="1102904"/>
+          <a:ext cx="759000" cy="379500"/>
+        </a:xfrm>
+        <a:prstGeom prst="rect">
+          <a:avLst/>
+        </a:prstGeom>
+        <a:solidFill>
+          <a:schemeClr val="accent1">
+            <a:hueOff val="0"/>
+            <a:satOff val="0"/>
+            <a:lumOff val="0"/>
+            <a:alphaOff val="0"/>
+          </a:schemeClr>
+        </a:solidFill>
+        <a:ln w="15875" cap="rnd" cmpd="sng" algn="ctr">
+          <a:solidFill>
+            <a:schemeClr val="lt1">
+              <a:hueOff val="0"/>
+              <a:satOff val="0"/>
+              <a:lumOff val="0"/>
+              <a:alphaOff val="0"/>
+            </a:schemeClr>
+          </a:solidFill>
+          <a:prstDash val="solid"/>
+        </a:ln>
+        <a:effectLst/>
+      </dsp:spPr>
+      <dsp:style>
+        <a:lnRef idx="2">
+          <a:scrgbClr r="0" g="0" b="0"/>
+        </a:lnRef>
+        <a:fillRef idx="1">
+          <a:scrgbClr r="0" g="0" b="0"/>
+        </a:fillRef>
+        <a:effectRef idx="0">
+          <a:scrgbClr r="0" g="0" b="0"/>
+        </a:effectRef>
+        <a:fontRef idx="minor">
+          <a:schemeClr val="lt1"/>
+        </a:fontRef>
+      </dsp:style>
+      <dsp:txBody>
+        <a:bodyPr spcFirstLastPara="0" vert="horz" wrap="square" lIns="15240" tIns="15240" rIns="15240" bIns="15240" numCol="1" spcCol="1270" anchor="ctr" anchorCtr="0">
+          <a:noAutofit/>
+        </a:bodyPr>
+        <a:lstStyle/>
+        <a:p>
+          <a:pPr lvl="0" algn="ctr" defTabSz="1066800">
+            <a:lnSpc>
+              <a:spcPct val="90000"/>
+            </a:lnSpc>
+            <a:spcBef>
+              <a:spcPct val="0"/>
+            </a:spcBef>
+            <a:spcAft>
+              <a:spcPct val="35000"/>
+            </a:spcAft>
+          </a:pPr>
+          <a:r>
+            <a:rPr lang="en-US" sz="2400" kern="1200" dirty="0" smtClean="0"/>
+            <a:t>div</a:t>
+          </a:r>
+          <a:endParaRPr lang="en-US" sz="2400" kern="1200" dirty="0"/>
+        </a:p>
+      </dsp:txBody>
+      <dsp:txXfrm>
+        <a:off x="1838827" y="1102904"/>
+        <a:ext cx="759000" cy="379500"/>
+      </dsp:txXfrm>
+    </dsp:sp>
+    <dsp:sp modelId="{3171F02D-87C0-430F-A798-D4224EDE384F}">
+      <dsp:nvSpPr>
+        <dsp:cNvPr id="0" name=""/>
+        <dsp:cNvSpPr/>
+      </dsp:nvSpPr>
+      <dsp:spPr>
+        <a:xfrm>
+          <a:off x="4134802" y="1102904"/>
+          <a:ext cx="759000" cy="379500"/>
+        </a:xfrm>
+        <a:prstGeom prst="rect">
+          <a:avLst/>
+        </a:prstGeom>
+        <a:solidFill>
+          <a:schemeClr val="accent1">
+            <a:hueOff val="0"/>
+            <a:satOff val="0"/>
+            <a:lumOff val="0"/>
+            <a:alphaOff val="0"/>
+          </a:schemeClr>
+        </a:solidFill>
+        <a:ln w="15875" cap="rnd" cmpd="sng" algn="ctr">
+          <a:solidFill>
+            <a:schemeClr val="lt1">
+              <a:hueOff val="0"/>
+              <a:satOff val="0"/>
+              <a:lumOff val="0"/>
+              <a:alphaOff val="0"/>
+            </a:schemeClr>
+          </a:solidFill>
+          <a:prstDash val="solid"/>
+        </a:ln>
+        <a:effectLst/>
+      </dsp:spPr>
+      <dsp:style>
+        <a:lnRef idx="2">
+          <a:scrgbClr r="0" g="0" b="0"/>
+        </a:lnRef>
+        <a:fillRef idx="1">
+          <a:scrgbClr r="0" g="0" b="0"/>
+        </a:fillRef>
+        <a:effectRef idx="0">
+          <a:scrgbClr r="0" g="0" b="0"/>
+        </a:effectRef>
+        <a:fontRef idx="minor">
+          <a:schemeClr val="lt1"/>
+        </a:fontRef>
+      </dsp:style>
+      <dsp:txBody>
+        <a:bodyPr spcFirstLastPara="0" vert="horz" wrap="square" lIns="15240" tIns="15240" rIns="15240" bIns="15240" numCol="1" spcCol="1270" anchor="ctr" anchorCtr="0">
+          <a:noAutofit/>
+        </a:bodyPr>
+        <a:lstStyle/>
+        <a:p>
+          <a:pPr lvl="0" algn="ctr" defTabSz="1066800">
+            <a:lnSpc>
+              <a:spcPct val="90000"/>
+            </a:lnSpc>
+            <a:spcBef>
+              <a:spcPct val="0"/>
+            </a:spcBef>
+            <a:spcAft>
+              <a:spcPct val="35000"/>
+            </a:spcAft>
+          </a:pPr>
+          <a:r>
+            <a:rPr lang="en-US" sz="2400" kern="1200" dirty="0" smtClean="0"/>
+            <a:t>p</a:t>
+          </a:r>
+          <a:endParaRPr lang="en-US" sz="2400" kern="1200" dirty="0"/>
+        </a:p>
+      </dsp:txBody>
+      <dsp:txXfrm>
+        <a:off x="4134802" y="1102904"/>
+        <a:ext cx="759000" cy="379500"/>
+      </dsp:txXfrm>
+    </dsp:sp>
+    <dsp:sp modelId="{DB4EAC3D-F29B-4572-BF41-8758393AE846}">
+      <dsp:nvSpPr>
+        <dsp:cNvPr id="0" name=""/>
+        <dsp:cNvSpPr/>
+      </dsp:nvSpPr>
+      <dsp:spPr>
+        <a:xfrm>
+          <a:off x="3216412" y="1641795"/>
+          <a:ext cx="759000" cy="379500"/>
+        </a:xfrm>
+        <a:prstGeom prst="rect">
+          <a:avLst/>
+        </a:prstGeom>
+        <a:solidFill>
+          <a:schemeClr val="accent1">
+            <a:hueOff val="0"/>
+            <a:satOff val="0"/>
+            <a:lumOff val="0"/>
+            <a:alphaOff val="0"/>
+          </a:schemeClr>
+        </a:solidFill>
+        <a:ln w="15875" cap="rnd" cmpd="sng" algn="ctr">
+          <a:solidFill>
+            <a:schemeClr val="lt1">
+              <a:hueOff val="0"/>
+              <a:satOff val="0"/>
+              <a:lumOff val="0"/>
+              <a:alphaOff val="0"/>
+            </a:schemeClr>
+          </a:solidFill>
+          <a:prstDash val="solid"/>
+        </a:ln>
+        <a:effectLst/>
+      </dsp:spPr>
+      <dsp:style>
+        <a:lnRef idx="2">
+          <a:scrgbClr r="0" g="0" b="0"/>
+        </a:lnRef>
+        <a:fillRef idx="1">
+          <a:scrgbClr r="0" g="0" b="0"/>
+        </a:fillRef>
+        <a:effectRef idx="0">
+          <a:scrgbClr r="0" g="0" b="0"/>
+        </a:effectRef>
+        <a:fontRef idx="minor">
+          <a:schemeClr val="lt1"/>
+        </a:fontRef>
+      </dsp:style>
+      <dsp:txBody>
+        <a:bodyPr spcFirstLastPara="0" vert="horz" wrap="square" lIns="15240" tIns="15240" rIns="15240" bIns="15240" numCol="1" spcCol="1270" anchor="ctr" anchorCtr="0">
+          <a:noAutofit/>
+        </a:bodyPr>
+        <a:lstStyle/>
+        <a:p>
+          <a:pPr lvl="0" algn="ctr" defTabSz="1066800">
+            <a:lnSpc>
+              <a:spcPct val="90000"/>
+            </a:lnSpc>
+            <a:spcBef>
+              <a:spcPct val="0"/>
+            </a:spcBef>
+            <a:spcAft>
+              <a:spcPct val="35000"/>
+            </a:spcAft>
+          </a:pPr>
+          <a:r>
+            <a:rPr lang="en-US" sz="2400" kern="1200" dirty="0" smtClean="0"/>
+            <a:t>table</a:t>
+          </a:r>
+          <a:endParaRPr lang="en-US" sz="2400" kern="1200" dirty="0"/>
+        </a:p>
+      </dsp:txBody>
+      <dsp:txXfrm>
+        <a:off x="3216412" y="1641795"/>
+        <a:ext cx="759000" cy="379500"/>
+      </dsp:txXfrm>
+    </dsp:sp>
+    <dsp:sp modelId="{1FE162B0-B155-4CD8-8967-4456231A8900}">
+      <dsp:nvSpPr>
+        <dsp:cNvPr id="0" name=""/>
+        <dsp:cNvSpPr/>
+      </dsp:nvSpPr>
+      <dsp:spPr>
+        <a:xfrm>
+          <a:off x="2298022" y="2180685"/>
+          <a:ext cx="759000" cy="379500"/>
+        </a:xfrm>
+        <a:prstGeom prst="rect">
+          <a:avLst/>
+        </a:prstGeom>
+        <a:solidFill>
+          <a:schemeClr val="accent1">
+            <a:hueOff val="0"/>
+            <a:satOff val="0"/>
+            <a:lumOff val="0"/>
+            <a:alphaOff val="0"/>
+          </a:schemeClr>
+        </a:solidFill>
+        <a:ln w="15875" cap="rnd" cmpd="sng" algn="ctr">
+          <a:solidFill>
+            <a:schemeClr val="lt1">
+              <a:hueOff val="0"/>
+              <a:satOff val="0"/>
+              <a:lumOff val="0"/>
+              <a:alphaOff val="0"/>
+            </a:schemeClr>
+          </a:solidFill>
+          <a:prstDash val="solid"/>
+        </a:ln>
+        <a:effectLst/>
+      </dsp:spPr>
+      <dsp:style>
+        <a:lnRef idx="2">
+          <a:scrgbClr r="0" g="0" b="0"/>
+        </a:lnRef>
+        <a:fillRef idx="1">
+          <a:scrgbClr r="0" g="0" b="0"/>
+        </a:fillRef>
+        <a:effectRef idx="0">
+          <a:scrgbClr r="0" g="0" b="0"/>
+        </a:effectRef>
+        <a:fontRef idx="minor">
+          <a:schemeClr val="lt1"/>
+        </a:fontRef>
+      </dsp:style>
+      <dsp:txBody>
+        <a:bodyPr spcFirstLastPara="0" vert="horz" wrap="square" lIns="15240" tIns="15240" rIns="15240" bIns="15240" numCol="1" spcCol="1270" anchor="ctr" anchorCtr="0">
+          <a:noAutofit/>
+        </a:bodyPr>
+        <a:lstStyle/>
+        <a:p>
+          <a:pPr lvl="0" algn="ctr" defTabSz="1066800">
+            <a:lnSpc>
+              <a:spcPct val="90000"/>
+            </a:lnSpc>
+            <a:spcBef>
+              <a:spcPct val="0"/>
+            </a:spcBef>
+            <a:spcAft>
+              <a:spcPct val="35000"/>
+            </a:spcAft>
+          </a:pPr>
+          <a:r>
+            <a:rPr lang="en-US" sz="2400" kern="1200" dirty="0" err="1" smtClean="0"/>
+            <a:t>tr</a:t>
+          </a:r>
+          <a:endParaRPr lang="en-US" sz="2400" kern="1200" dirty="0"/>
+        </a:p>
+      </dsp:txBody>
+      <dsp:txXfrm>
+        <a:off x="2298022" y="2180685"/>
+        <a:ext cx="759000" cy="379500"/>
+      </dsp:txXfrm>
+    </dsp:sp>
+    <dsp:sp modelId="{60160279-E65E-4CBB-9171-63734424D5DD}">
+      <dsp:nvSpPr>
+        <dsp:cNvPr id="0" name=""/>
+        <dsp:cNvSpPr/>
+      </dsp:nvSpPr>
+      <dsp:spPr>
+        <a:xfrm>
+          <a:off x="1838827" y="2719575"/>
+          <a:ext cx="759000" cy="379500"/>
+        </a:xfrm>
+        <a:prstGeom prst="rect">
+          <a:avLst/>
+        </a:prstGeom>
+        <a:solidFill>
+          <a:schemeClr val="accent1">
+            <a:hueOff val="0"/>
+            <a:satOff val="0"/>
+            <a:lumOff val="0"/>
+            <a:alphaOff val="0"/>
+          </a:schemeClr>
+        </a:solidFill>
+        <a:ln w="15875" cap="rnd" cmpd="sng" algn="ctr">
+          <a:solidFill>
+            <a:schemeClr val="lt1">
+              <a:hueOff val="0"/>
+              <a:satOff val="0"/>
+              <a:lumOff val="0"/>
+              <a:alphaOff val="0"/>
+            </a:schemeClr>
+          </a:solidFill>
+          <a:prstDash val="solid"/>
+        </a:ln>
+        <a:effectLst/>
+      </dsp:spPr>
+      <dsp:style>
+        <a:lnRef idx="2">
+          <a:scrgbClr r="0" g="0" b="0"/>
+        </a:lnRef>
+        <a:fillRef idx="1">
+          <a:scrgbClr r="0" g="0" b="0"/>
+        </a:fillRef>
+        <a:effectRef idx="0">
+          <a:scrgbClr r="0" g="0" b="0"/>
+        </a:effectRef>
+        <a:fontRef idx="minor">
+          <a:schemeClr val="lt1"/>
+        </a:fontRef>
+      </dsp:style>
+      <dsp:txBody>
+        <a:bodyPr spcFirstLastPara="0" vert="horz" wrap="square" lIns="15240" tIns="15240" rIns="15240" bIns="15240" numCol="1" spcCol="1270" anchor="ctr" anchorCtr="0">
+          <a:noAutofit/>
+        </a:bodyPr>
+        <a:lstStyle/>
+        <a:p>
+          <a:pPr lvl="0" algn="ctr" defTabSz="1066800">
+            <a:lnSpc>
+              <a:spcPct val="90000"/>
+            </a:lnSpc>
+            <a:spcBef>
+              <a:spcPct val="0"/>
+            </a:spcBef>
+            <a:spcAft>
+              <a:spcPct val="35000"/>
+            </a:spcAft>
+          </a:pPr>
+          <a:r>
+            <a:rPr lang="en-US" sz="2400" kern="1200" dirty="0" smtClean="0"/>
+            <a:t>td</a:t>
+          </a:r>
+          <a:endParaRPr lang="en-US" sz="2400" kern="1200" dirty="0"/>
+        </a:p>
+      </dsp:txBody>
+      <dsp:txXfrm>
+        <a:off x="1838827" y="2719575"/>
+        <a:ext cx="759000" cy="379500"/>
+      </dsp:txXfrm>
+    </dsp:sp>
+    <dsp:sp modelId="{916BCDFB-B60F-4D83-B52F-056320E42EEF}">
+      <dsp:nvSpPr>
+        <dsp:cNvPr id="0" name=""/>
+        <dsp:cNvSpPr/>
+      </dsp:nvSpPr>
+      <dsp:spPr>
+        <a:xfrm>
+          <a:off x="2757217" y="2719575"/>
+          <a:ext cx="759000" cy="379500"/>
+        </a:xfrm>
+        <a:prstGeom prst="rect">
+          <a:avLst/>
+        </a:prstGeom>
+        <a:solidFill>
+          <a:schemeClr val="accent1">
+            <a:hueOff val="0"/>
+            <a:satOff val="0"/>
+            <a:lumOff val="0"/>
+            <a:alphaOff val="0"/>
+          </a:schemeClr>
+        </a:solidFill>
+        <a:ln w="15875" cap="rnd" cmpd="sng" algn="ctr">
+          <a:solidFill>
+            <a:schemeClr val="lt1">
+              <a:hueOff val="0"/>
+              <a:satOff val="0"/>
+              <a:lumOff val="0"/>
+              <a:alphaOff val="0"/>
+            </a:schemeClr>
+          </a:solidFill>
+          <a:prstDash val="solid"/>
+        </a:ln>
+        <a:effectLst/>
+      </dsp:spPr>
+      <dsp:style>
+        <a:lnRef idx="2">
+          <a:scrgbClr r="0" g="0" b="0"/>
+        </a:lnRef>
+        <a:fillRef idx="1">
+          <a:scrgbClr r="0" g="0" b="0"/>
+        </a:fillRef>
+        <a:effectRef idx="0">
+          <a:scrgbClr r="0" g="0" b="0"/>
+        </a:effectRef>
+        <a:fontRef idx="minor">
+          <a:schemeClr val="lt1"/>
+        </a:fontRef>
+      </dsp:style>
+      <dsp:txBody>
+        <a:bodyPr spcFirstLastPara="0" vert="horz" wrap="square" lIns="15240" tIns="15240" rIns="15240" bIns="15240" numCol="1" spcCol="1270" anchor="ctr" anchorCtr="0">
+          <a:noAutofit/>
+        </a:bodyPr>
+        <a:lstStyle/>
+        <a:p>
+          <a:pPr lvl="0" algn="ctr" defTabSz="1066800">
+            <a:lnSpc>
+              <a:spcPct val="90000"/>
+            </a:lnSpc>
+            <a:spcBef>
+              <a:spcPct val="0"/>
+            </a:spcBef>
+            <a:spcAft>
+              <a:spcPct val="35000"/>
+            </a:spcAft>
+          </a:pPr>
+          <a:r>
+            <a:rPr lang="en-US" sz="2400" kern="1200" dirty="0" smtClean="0"/>
+            <a:t>td</a:t>
+          </a:r>
+          <a:endParaRPr lang="en-US" sz="2400" kern="1200" dirty="0"/>
+        </a:p>
+      </dsp:txBody>
+      <dsp:txXfrm>
+        <a:off x="2757217" y="2719575"/>
+        <a:ext cx="759000" cy="379500"/>
+      </dsp:txXfrm>
+    </dsp:sp>
   </dsp:spTree>
 </dsp:drawing>
 </file>
@@ -4372,7 +5798,7 @@
           <a:p>
             <a:fld id="{D10AF160-CD5A-4A77-96B0-C85B80371432}" type="datetimeFigureOut">
               <a:rPr lang="en-US" smtClean="0"/>
-              <a:t>19-May-16</a:t>
+              <a:t>30-May-17</a:t>
             </a:fld>
             <a:endParaRPr lang="en-US"/>
           </a:p>
@@ -4537,7 +5963,7 @@
           <a:p>
             <a:fld id="{F6A950C5-F15E-44EA-AF6A-22227443235C}" type="datetimeFigureOut">
               <a:rPr lang="en-US" smtClean="0"/>
-              <a:t>19-May-16</a:t>
+              <a:t>30-May-17</a:t>
             </a:fld>
             <a:endParaRPr lang="en-US"/>
           </a:p>
@@ -5310,7 +6736,7 @@
           <a:p>
             <a:fld id="{6F66794D-9D79-4AC5-96DA-597EA4BF2704}" type="datetimeFigureOut">
               <a:rPr lang="en-US" smtClean="0"/>
-              <a:t>19-May-16</a:t>
+              <a:t>30-May-17</a:t>
             </a:fld>
             <a:endParaRPr lang="en-US"/>
           </a:p>
@@ -5644,7 +7070,7 @@
           <a:p>
             <a:fld id="{6F66794D-9D79-4AC5-96DA-597EA4BF2704}" type="datetimeFigureOut">
               <a:rPr lang="en-US" smtClean="0"/>
-              <a:t>19-May-16</a:t>
+              <a:t>30-May-17</a:t>
             </a:fld>
             <a:endParaRPr lang="en-US"/>
           </a:p>
@@ -5900,7 +7326,7 @@
           <a:p>
             <a:fld id="{6F66794D-9D79-4AC5-96DA-597EA4BF2704}" type="datetimeFigureOut">
               <a:rPr lang="en-US" smtClean="0"/>
-              <a:t>19-May-16</a:t>
+              <a:t>30-May-17</a:t>
             </a:fld>
             <a:endParaRPr lang="en-US"/>
           </a:p>
@@ -6448,7 +7874,7 @@
           <a:p>
             <a:fld id="{6F66794D-9D79-4AC5-96DA-597EA4BF2704}" type="datetimeFigureOut">
               <a:rPr lang="en-US" smtClean="0"/>
-              <a:t>19-May-16</a:t>
+              <a:t>30-May-17</a:t>
             </a:fld>
             <a:endParaRPr lang="en-US"/>
           </a:p>
@@ -6704,7 +8130,7 @@
           <a:p>
             <a:fld id="{6F66794D-9D79-4AC5-96DA-597EA4BF2704}" type="datetimeFigureOut">
               <a:rPr lang="en-US" smtClean="0"/>
-              <a:t>19-May-16</a:t>
+              <a:t>30-May-17</a:t>
             </a:fld>
             <a:endParaRPr lang="en-US"/>
           </a:p>
@@ -7244,7 +8670,7 @@
           <a:p>
             <a:fld id="{6F66794D-9D79-4AC5-96DA-597EA4BF2704}" type="datetimeFigureOut">
               <a:rPr lang="en-US" smtClean="0"/>
-              <a:t>19-May-16</a:t>
+              <a:t>30-May-17</a:t>
             </a:fld>
             <a:endParaRPr lang="en-US"/>
           </a:p>
@@ -7549,7 +8975,7 @@
           <a:p>
             <a:fld id="{6F66794D-9D79-4AC5-96DA-597EA4BF2704}" type="datetimeFigureOut">
               <a:rPr lang="en-US" smtClean="0"/>
-              <a:t>19-May-16</a:t>
+              <a:t>30-May-17</a:t>
             </a:fld>
             <a:endParaRPr lang="en-US"/>
           </a:p>
@@ -7731,7 +9157,7 @@
           <a:p>
             <a:fld id="{6F66794D-9D79-4AC5-96DA-597EA4BF2704}" type="datetimeFigureOut">
               <a:rPr lang="en-US" smtClean="0"/>
-              <a:t>19-May-16</a:t>
+              <a:t>30-May-17</a:t>
             </a:fld>
             <a:endParaRPr lang="en-US"/>
           </a:p>
@@ -7919,7 +9345,7 @@
           <a:p>
             <a:fld id="{6F66794D-9D79-4AC5-96DA-597EA4BF2704}" type="datetimeFigureOut">
               <a:rPr lang="en-US" smtClean="0"/>
-              <a:t>19-May-16</a:t>
+              <a:t>30-May-17</a:t>
             </a:fld>
             <a:endParaRPr lang="en-US"/>
           </a:p>
@@ -8097,7 +9523,7 @@
           <a:p>
             <a:fld id="{6F66794D-9D79-4AC5-96DA-597EA4BF2704}" type="datetimeFigureOut">
               <a:rPr lang="en-US" smtClean="0"/>
-              <a:t>19-May-16</a:t>
+              <a:t>30-May-17</a:t>
             </a:fld>
             <a:endParaRPr lang="en-US"/>
           </a:p>
@@ -8386,7 +9812,7 @@
           <a:p>
             <a:fld id="{6F66794D-9D79-4AC5-96DA-597EA4BF2704}" type="datetimeFigureOut">
               <a:rPr lang="en-US" smtClean="0"/>
-              <a:t>19-May-16</a:t>
+              <a:t>30-May-17</a:t>
             </a:fld>
             <a:endParaRPr lang="en-US"/>
           </a:p>
@@ -8691,7 +10117,7 @@
           <a:p>
             <a:fld id="{6F66794D-9D79-4AC5-96DA-597EA4BF2704}" type="datetimeFigureOut">
               <a:rPr lang="en-US" smtClean="0"/>
-              <a:t>19-May-16</a:t>
+              <a:t>30-May-17</a:t>
             </a:fld>
             <a:endParaRPr lang="en-US"/>
           </a:p>
@@ -9171,7 +10597,7 @@
           <a:p>
             <a:fld id="{6F66794D-9D79-4AC5-96DA-597EA4BF2704}" type="datetimeFigureOut">
               <a:rPr lang="en-US" smtClean="0"/>
-              <a:t>19-May-16</a:t>
+              <a:t>30-May-17</a:t>
             </a:fld>
             <a:endParaRPr lang="en-US"/>
           </a:p>
@@ -9327,7 +10753,7 @@
           <a:p>
             <a:fld id="{6F66794D-9D79-4AC5-96DA-597EA4BF2704}" type="datetimeFigureOut">
               <a:rPr lang="en-US" smtClean="0"/>
-              <a:t>19-May-16</a:t>
+              <a:t>30-May-17</a:t>
             </a:fld>
             <a:endParaRPr lang="en-US"/>
           </a:p>
@@ -9430,7 +10856,7 @@
           <a:p>
             <a:fld id="{6F66794D-9D79-4AC5-96DA-597EA4BF2704}" type="datetimeFigureOut">
               <a:rPr lang="en-US" smtClean="0"/>
-              <a:t>19-May-16</a:t>
+              <a:t>30-May-17</a:t>
             </a:fld>
             <a:endParaRPr lang="en-US"/>
           </a:p>
@@ -9721,7 +11147,7 @@
           <a:p>
             <a:fld id="{6F66794D-9D79-4AC5-96DA-597EA4BF2704}" type="datetimeFigureOut">
               <a:rPr lang="en-US" smtClean="0"/>
-              <a:t>19-May-16</a:t>
+              <a:t>30-May-17</a:t>
             </a:fld>
             <a:endParaRPr lang="en-US"/>
           </a:p>
@@ -10020,7 +11446,7 @@
           <a:p>
             <a:fld id="{6F66794D-9D79-4AC5-96DA-597EA4BF2704}" type="datetimeFigureOut">
               <a:rPr lang="en-US" smtClean="0"/>
-              <a:t>19-May-16</a:t>
+              <a:t>30-May-17</a:t>
             </a:fld>
             <a:endParaRPr lang="en-US"/>
           </a:p>
@@ -10558,7 +11984,7 @@
           <a:p>
             <a:fld id="{6F66794D-9D79-4AC5-96DA-597EA4BF2704}" type="datetimeFigureOut">
               <a:rPr lang="en-US" smtClean="0"/>
-              <a:t>19-May-16</a:t>
+              <a:t>30-May-17</a:t>
             </a:fld>
             <a:endParaRPr lang="en-US"/>
           </a:p>
@@ -11897,6 +13323,13 @@
       <p:transition spd="slow"/>
     </mc:Fallback>
   </mc:AlternateContent>
+  <p:timing>
+    <p:tnLst>
+      <p:par>
+        <p:cTn id="1" dur="indefinite" restart="never" nodeType="tmRoot"/>
+      </p:par>
+    </p:tnLst>
+  </p:timing>
 </p:sld>
 </file>
 
@@ -14759,13 +16192,13 @@
               <a:rPr lang="en-US" sz="1800" b="0" dirty="0" smtClean="0">
                 <a:effectLst/>
               </a:rPr>
-              <a:t>(trainer</a:t>
+              <a:t>(team); </a:t>
             </a:r>
             <a:r>
               <a:rPr lang="en-US" sz="1800" b="0" dirty="0">
                 <a:effectLst/>
               </a:rPr>
-              <a:t>); //remove a selected element </a:t>
+              <a:t>//remove a selected element </a:t>
             </a:r>
             <a:endParaRPr lang="en-US" sz="1800" b="0" dirty="0" smtClean="0">
               <a:effectLst/>
@@ -16481,6 +17914,13 @@
       <p:transition spd="slow"/>
     </mc:Fallback>
   </mc:AlternateContent>
+  <p:timing>
+    <p:tnLst>
+      <p:par>
+        <p:cTn id="1" dur="indefinite" restart="never" nodeType="tmRoot"/>
+      </p:par>
+    </p:tnLst>
+  </p:timing>
 </p:sld>
 </file>
 
@@ -16694,6 +18134,13 @@
       <p:transition spd="slow"/>
     </mc:Fallback>
   </mc:AlternateContent>
+  <p:timing>
+    <p:tnLst>
+      <p:par>
+        <p:cTn id="1" dur="indefinite" restart="never" nodeType="tmRoot"/>
+      </p:par>
+    </p:tnLst>
+  </p:timing>
 </p:sld>
 </file>
 
@@ -16959,6 +18406,13 @@
       <p:transition spd="slow"/>
     </mc:Fallback>
   </mc:AlternateContent>
+  <p:timing>
+    <p:tnLst>
+      <p:par>
+        <p:cTn id="1" dur="indefinite" restart="never" nodeType="tmRoot"/>
+      </p:par>
+    </p:tnLst>
+  </p:timing>
 </p:sld>
 </file>
 
@@ -17434,6 +18888,13 @@
       <p:transition spd="slow"/>
     </mc:Fallback>
   </mc:AlternateContent>
+  <p:timing>
+    <p:tnLst>
+      <p:par>
+        <p:cTn id="1" dur="indefinite" restart="never" nodeType="tmRoot"/>
+      </p:par>
+    </p:tnLst>
+  </p:timing>
 </p:sld>
 </file>
 
@@ -17587,11 +19048,7 @@
             </a:r>
             <a:r>
               <a:rPr lang="bg-BG" dirty="0" smtClean="0"/>
-              <a:t> </a:t>
-            </a:r>
-            <a:r>
-              <a:rPr lang="bg-BG" dirty="0" smtClean="0"/>
-              <a:t>код, който по зададено </a:t>
+              <a:t> код, който по зададено </a:t>
             </a:r>
             <a:r>
               <a:rPr lang="en-US" dirty="0" smtClean="0"/>
@@ -18097,6 +19554,13 @@
       <p:transition spd="slow"/>
     </mc:Fallback>
   </mc:AlternateContent>
+  <p:timing>
+    <p:tnLst>
+      <p:par>
+        <p:cTn id="1" dur="indefinite" restart="never" nodeType="tmRoot"/>
+      </p:par>
+    </p:tnLst>
+  </p:timing>
 </p:sld>
 </file>
 
@@ -18352,6 +19816,13 @@
       <p:transition spd="slow"/>
     </mc:Fallback>
   </mc:AlternateContent>
+  <p:timing>
+    <p:tnLst>
+      <p:par>
+        <p:cTn id="1" dur="indefinite" restart="never" nodeType="tmRoot"/>
+      </p:par>
+    </p:tnLst>
+  </p:timing>
 </p:sld>
 </file>
 
@@ -18955,6 +20426,13 @@
       <p:transition spd="slow"/>
     </mc:Fallback>
   </mc:AlternateContent>
+  <p:timing>
+    <p:tnLst>
+      <p:par>
+        <p:cTn id="1" dur="indefinite" restart="never" nodeType="tmRoot"/>
+      </p:par>
+    </p:tnLst>
+  </p:timing>
 </p:sld>
 </file>
 
@@ -19496,6 +20974,13 @@
       <p:transition spd="slow"/>
     </mc:Fallback>
   </mc:AlternateContent>
+  <p:timing>
+    <p:tnLst>
+      <p:par>
+        <p:cTn id="1" dur="indefinite" restart="never" nodeType="tmRoot"/>
+      </p:par>
+    </p:tnLst>
+  </p:timing>
 </p:sld>
 </file>
 
@@ -20079,6 +21564,13 @@
       <p:transition spd="slow"/>
     </mc:Fallback>
   </mc:AlternateContent>
+  <p:timing>
+    <p:tnLst>
+      <p:par>
+        <p:cTn id="1" dur="indefinite" restart="never" nodeType="tmRoot"/>
+      </p:par>
+    </p:tnLst>
+  </p:timing>
 </p:sld>
 </file>
 

</xml_diff>